<commit_message>
Updates RNotebook and presentations
</commit_message>
<xml_diff>
--- a/inst/content/powerpoint-state/access-to-care-rmarkdown.pptx
+++ b/inst/content/powerpoint-state/access-to-care-rmarkdown.pptx
@@ -1,6 +1,6 @@
 
 <file path=ppt/presentation.xml><?xml version="1.0" encoding="utf-8"?>
-<p:presentation xmlns:a="http://schemas.openxmlformats.org/drawingml/2006/main" xmlns:r="http://schemas.openxmlformats.org/officeDocument/2006/relationships" xmlns:p="http://schemas.openxmlformats.org/presentationml/2006/main" saveSubsetFonts="1">
+<p:presentation xmlns:a="http://schemas.openxmlformats.org/drawingml/2006/main" xmlns:p="http://schemas.openxmlformats.org/presentationml/2006/main" xmlns:r="http://schemas.openxmlformats.org/officeDocument/2006/relationships" saveSubsetFonts="1">
   <p:sldMasterIdLst>
     <p:sldMasterId id="2147484192" r:id="rId1"/>
   </p:sldMasterIdLst>
@@ -9,7 +9,6 @@
     <p:sldId id="257" r:id="rId3"/>
     <p:sldId id="258" r:id="rId4"/>
     <p:sldId id="259" r:id="rId5"/>
-    <p:sldId id="260" r:id="rId6"/>
   </p:sldIdLst>
   <p:sldSz cx="12192000" cy="6858000"/>
   <p:notesSz cx="6858000" cy="9144000"/>
@@ -17,8 +16,8 @@
     <a:defPPr>
       <a:defRPr lang="en-US"/>
     </a:defPPr>
-    <a:lvl1pPr marL="0" algn="l" defTabSz="914400" rtl="0" eaLnBrk="1" latinLnBrk="0" hangingPunct="1">
-      <a:defRPr sz="1800" kern="1200">
+    <a:lvl1pPr algn="l" defTabSz="914400" eaLnBrk="1" hangingPunct="1" latinLnBrk="0" marL="0" rtl="0">
+      <a:defRPr kern="1200" sz="1800">
         <a:solidFill>
           <a:schemeClr val="tx1"/>
         </a:solidFill>
@@ -27,8 +26,8 @@
         <a:cs typeface="+mn-cs"/>
       </a:defRPr>
     </a:lvl1pPr>
-    <a:lvl2pPr marL="457200" algn="l" defTabSz="914400" rtl="0" eaLnBrk="1" latinLnBrk="0" hangingPunct="1">
-      <a:defRPr sz="1800" kern="1200">
+    <a:lvl2pPr algn="l" defTabSz="914400" eaLnBrk="1" hangingPunct="1" latinLnBrk="0" marL="457200" rtl="0">
+      <a:defRPr kern="1200" sz="1800">
         <a:solidFill>
           <a:schemeClr val="tx1"/>
         </a:solidFill>
@@ -37,8 +36,8 @@
         <a:cs typeface="+mn-cs"/>
       </a:defRPr>
     </a:lvl2pPr>
-    <a:lvl3pPr marL="914400" algn="l" defTabSz="914400" rtl="0" eaLnBrk="1" latinLnBrk="0" hangingPunct="1">
-      <a:defRPr sz="1800" kern="1200">
+    <a:lvl3pPr algn="l" defTabSz="914400" eaLnBrk="1" hangingPunct="1" latinLnBrk="0" marL="914400" rtl="0">
+      <a:defRPr kern="1200" sz="1800">
         <a:solidFill>
           <a:schemeClr val="tx1"/>
         </a:solidFill>
@@ -47,8 +46,8 @@
         <a:cs typeface="+mn-cs"/>
       </a:defRPr>
     </a:lvl3pPr>
-    <a:lvl4pPr marL="1371600" algn="l" defTabSz="914400" rtl="0" eaLnBrk="1" latinLnBrk="0" hangingPunct="1">
-      <a:defRPr sz="1800" kern="1200">
+    <a:lvl4pPr algn="l" defTabSz="914400" eaLnBrk="1" hangingPunct="1" latinLnBrk="0" marL="1371600" rtl="0">
+      <a:defRPr kern="1200" sz="1800">
         <a:solidFill>
           <a:schemeClr val="tx1"/>
         </a:solidFill>
@@ -57,8 +56,8 @@
         <a:cs typeface="+mn-cs"/>
       </a:defRPr>
     </a:lvl4pPr>
-    <a:lvl5pPr marL="1828800" algn="l" defTabSz="914400" rtl="0" eaLnBrk="1" latinLnBrk="0" hangingPunct="1">
-      <a:defRPr sz="1800" kern="1200">
+    <a:lvl5pPr algn="l" defTabSz="914400" eaLnBrk="1" hangingPunct="1" latinLnBrk="0" marL="1828800" rtl="0">
+      <a:defRPr kern="1200" sz="1800">
         <a:solidFill>
           <a:schemeClr val="tx1"/>
         </a:solidFill>
@@ -67,8 +66,8 @@
         <a:cs typeface="+mn-cs"/>
       </a:defRPr>
     </a:lvl5pPr>
-    <a:lvl6pPr marL="2286000" algn="l" defTabSz="914400" rtl="0" eaLnBrk="1" latinLnBrk="0" hangingPunct="1">
-      <a:defRPr sz="1800" kern="1200">
+    <a:lvl6pPr algn="l" defTabSz="914400" eaLnBrk="1" hangingPunct="1" latinLnBrk="0" marL="2286000" rtl="0">
+      <a:defRPr kern="1200" sz="1800">
         <a:solidFill>
           <a:schemeClr val="tx1"/>
         </a:solidFill>
@@ -77,8 +76,8 @@
         <a:cs typeface="+mn-cs"/>
       </a:defRPr>
     </a:lvl6pPr>
-    <a:lvl7pPr marL="2743200" algn="l" defTabSz="914400" rtl="0" eaLnBrk="1" latinLnBrk="0" hangingPunct="1">
-      <a:defRPr sz="1800" kern="1200">
+    <a:lvl7pPr algn="l" defTabSz="914400" eaLnBrk="1" hangingPunct="1" latinLnBrk="0" marL="2743200" rtl="0">
+      <a:defRPr kern="1200" sz="1800">
         <a:solidFill>
           <a:schemeClr val="tx1"/>
         </a:solidFill>
@@ -87,8 +86,8 @@
         <a:cs typeface="+mn-cs"/>
       </a:defRPr>
     </a:lvl7pPr>
-    <a:lvl8pPr marL="3200400" algn="l" defTabSz="914400" rtl="0" eaLnBrk="1" latinLnBrk="0" hangingPunct="1">
-      <a:defRPr sz="1800" kern="1200">
+    <a:lvl8pPr algn="l" defTabSz="914400" eaLnBrk="1" hangingPunct="1" latinLnBrk="0" marL="3200400" rtl="0">
+      <a:defRPr kern="1200" sz="1800">
         <a:solidFill>
           <a:schemeClr val="tx1"/>
         </a:solidFill>
@@ -97,8 +96,8 @@
         <a:cs typeface="+mn-cs"/>
       </a:defRPr>
     </a:lvl8pPr>
-    <a:lvl9pPr marL="3657600" algn="l" defTabSz="914400" rtl="0" eaLnBrk="1" latinLnBrk="0" hangingPunct="1">
-      <a:defRPr sz="1800" kern="1200">
+    <a:lvl9pPr algn="l" defTabSz="914400" eaLnBrk="1" hangingPunct="1" latinLnBrk="0" marL="3657600" rtl="0">
+      <a:defRPr kern="1200" sz="1800">
         <a:solidFill>
           <a:schemeClr val="tx1"/>
         </a:solidFill>
@@ -3416,7 +3415,7 @@
             <a:spLocks noGrp="1"/>
           </p:cNvSpPr>
           <p:nvPr>
-            <p:ph type="subTitle" idx="1"/>
+            <p:ph idx="1" type="subTitle"/>
           </p:nvPr>
         </p:nvSpPr>
         <p:spPr>
@@ -3437,41 +3436,6 @@
           </a:p>
         </p:txBody>
       </p:sp>
-      <p:cxnSp>
-        <p:nvCxnSpPr>
-          <p:cNvPr id="8" name="Straight Connector 7"/>
-          <p:cNvCxnSpPr/>
-          <p:nvPr/>
-        </p:nvCxnSpPr>
-        <p:spPr>
-          <a:xfrm>
-            <a:off x="1978660" y="3733800"/>
-            <a:ext cx="8229601" cy="0"/>
-          </a:xfrm>
-          <a:prstGeom prst="line">
-            <a:avLst/>
-          </a:prstGeom>
-          <a:ln>
-            <a:solidFill>
-              <a:srgbClr val="FFFFFF"/>
-            </a:solidFill>
-          </a:ln>
-        </p:spPr>
-        <p:style>
-          <a:lnRef idx="1">
-            <a:schemeClr val="accent1"/>
-          </a:lnRef>
-          <a:fillRef idx="0">
-            <a:schemeClr val="accent1"/>
-          </a:fillRef>
-          <a:effectRef idx="0">
-            <a:schemeClr val="accent1"/>
-          </a:effectRef>
-          <a:fontRef idx="minor">
-            <a:schemeClr val="tx1"/>
-          </a:fontRef>
-        </p:style>
-      </p:cxnSp>
     </p:spTree>
   </p:cSld>
 </p:sld>
@@ -3524,41 +3488,6 @@
           </a:p>
         </p:txBody>
       </p:sp>
-      <p:cxnSp>
-        <p:nvCxnSpPr>
-          <p:cNvPr id="7" name="Straight Connector 6"/>
-          <p:cNvCxnSpPr/>
-          <p:nvPr/>
-        </p:nvCxnSpPr>
-        <p:spPr>
-          <a:xfrm>
-            <a:off x="1981200" y="4020408"/>
-            <a:ext cx="8229601" cy="0"/>
-          </a:xfrm>
-          <a:prstGeom prst="line">
-            <a:avLst/>
-          </a:prstGeom>
-          <a:ln>
-            <a:solidFill>
-              <a:schemeClr val="accent1"/>
-            </a:solidFill>
-          </a:ln>
-        </p:spPr>
-        <p:style>
-          <a:lnRef idx="1">
-            <a:schemeClr val="accent1"/>
-          </a:lnRef>
-          <a:fillRef idx="0">
-            <a:schemeClr val="accent1"/>
-          </a:fillRef>
-          <a:effectRef idx="0">
-            <a:schemeClr val="accent1"/>
-          </a:effectRef>
-          <a:fontRef idx="minor">
-            <a:schemeClr val="tx1"/>
-          </a:fontRef>
-        </p:style>
-      </p:cxnSp>
     </p:spTree>
   </p:cSld>
 </p:sld>
@@ -3747,116 +3676,6 @@
           </a:ln>
         </p:spPr>
       </p:pic>
-    </p:spTree>
-  </p:cSld>
-</p:sld>
-</file>
-
-<file path=ppt/slides/slide5.xml><?xml version="1.0" encoding="utf-8"?>
-<p:sld xmlns:a="http://schemas.openxmlformats.org/drawingml/2006/main" xmlns:r="http://schemas.openxmlformats.org/officeDocument/2006/relationships" xmlns:p="http://schemas.openxmlformats.org/presentationml/2006/main">
-  <p:cSld>
-    <p:spTree>
-      <p:nvGrpSpPr>
-        <p:cNvPr id="1" name=""/>
-        <p:cNvGrpSpPr/>
-        <p:nvPr/>
-      </p:nvGrpSpPr>
-      <p:grpSpPr>
-        <a:xfrm>
-          <a:off x="0" y="0"/>
-          <a:ext cx="0" cy="0"/>
-          <a:chOff x="0" y="0"/>
-          <a:chExt cx="0" cy="0"/>
-        </a:xfrm>
-      </p:grpSpPr>
-      <p:sp>
-        <p:nvSpPr>
-          <p:cNvPr id="2" name="Title 1"/>
-          <p:cNvSpPr>
-            <a:spLocks noGrp="1"/>
-          </p:cNvSpPr>
-          <p:nvPr>
-            <p:ph type="title"/>
-          </p:nvPr>
-        </p:nvSpPr>
-        <p:spPr/>
-        <p:txBody>
-          <a:bodyPr/>
-          <a:lstStyle/>
-          <a:p>
-            <a:pPr lvl="0" marL="0" indent="0">
-              <a:buNone/>
-            </a:pPr>
-            <a:r>
-              <a:rPr/>
-              <a:t>County</a:t>
-            </a:r>
-            <a:r>
-              <a:rPr/>
-              <a:t> </a:t>
-            </a:r>
-            <a:r>
-              <a:rPr/>
-              <a:t>Data</a:t>
-            </a:r>
-          </a:p>
-        </p:txBody>
-      </p:sp>
-      <p:sp>
-        <p:nvSpPr>
-          <p:cNvPr id="8" name="Text Placeholder 2">
-            <a:extLst>
-              <a:ext uri="{FF2B5EF4-FFF2-40B4-BE49-F238E27FC236}">
-                <a16:creationId xmlns:a16="http://schemas.microsoft.com/office/drawing/2014/main" id="{40AB4180-BC29-450C-85BC-984099FB6C8A}"/>
-              </a:ext>
-            </a:extLst>
-          </p:cNvPr>
-          <p:cNvSpPr>
-            <a:spLocks noGrp="1"/>
-          </p:cNvSpPr>
-          <p:nvPr>
-            <p:ph idx="1"/>
-          </p:nvPr>
-        </p:nvSpPr>
-        <p:spPr/>
-        <p:txBody>
-          <a:bodyPr/>
-          <a:lstStyle/>
-          <a:p>
-            <a:pPr lvl="0" marL="0" indent="0">
-              <a:buNone/>
-            </a:pPr>
-            <a:r>
-              <a:rPr/>
-              <a:t>Counties with above or below the number of hostpitals expected.</a:t>
-            </a:r>
-          </a:p>
-          <a:p>
-            <a:pPr lvl="0" marL="1270000" indent="0">
-              <a:buNone/>
-            </a:pPr>
-            <a:r>
-              <a:rPr sz="1800">
-                <a:latin typeface="Courier"/>
-              </a:rPr>
-              <a:t>## # A tibble: 58 x 5
-##    County       Population Hospitals Expected `Model Result`
-##    &lt;chr&gt;        &lt;chr&gt;          &lt;dbl&gt;    &lt;dbl&gt; &lt;chr&gt;         
-##  1 Alameda      2M                13       11 Acceptable    
-##  2 Alpine       1K                 0        1 Acceptable    
-##  3 Amador       37K                1        1 Acceptable    
-##  4 Butte        225K               4        2 Acceptable    
-##  5 Calaveras    45K                1        1 Acceptable    
-##  6 Colusa       21K                0        1 Acceptable    
-##  7 Contra Costa 1M                 0        8 Under         
-##  8 Del Norte    27K                1        1 Acceptable    
-##  9 El Dorado    184K               2        2 Acceptable    
-## 10 Fresno       975K               7        7 Acceptable    
-## # … with 48 more rows</a:t>
-            </a:r>
-          </a:p>
-        </p:txBody>
-      </p:sp>
     </p:spTree>
   </p:cSld>
 </p:sld>

</xml_diff>